<commit_message>
add various prac files
</commit_message>
<xml_diff>
--- a/CSC8360 - Course Objectives.pptx
+++ b/CSC8360 - Course Objectives.pptx
@@ -263,7 +263,7 @@
           <a:p>
             <a:fld id="{E4E07C8C-229A-4822-9E80-83EA7465900A}" type="datetimeFigureOut">
               <a:rPr lang="en-AU" smtClean="0"/>
-              <a:t>28/03/2022</a:t>
+              <a:t>14/05/2022</a:t>
             </a:fld>
             <a:endParaRPr lang="en-AU"/>
           </a:p>
@@ -463,7 +463,7 @@
           <a:p>
             <a:fld id="{E4E07C8C-229A-4822-9E80-83EA7465900A}" type="datetimeFigureOut">
               <a:rPr lang="en-AU" smtClean="0"/>
-              <a:t>28/03/2022</a:t>
+              <a:t>14/05/2022</a:t>
             </a:fld>
             <a:endParaRPr lang="en-AU"/>
           </a:p>
@@ -673,7 +673,7 @@
           <a:p>
             <a:fld id="{E4E07C8C-229A-4822-9E80-83EA7465900A}" type="datetimeFigureOut">
               <a:rPr lang="en-AU" smtClean="0"/>
-              <a:t>28/03/2022</a:t>
+              <a:t>14/05/2022</a:t>
             </a:fld>
             <a:endParaRPr lang="en-AU"/>
           </a:p>
@@ -873,7 +873,7 @@
           <a:p>
             <a:fld id="{E4E07C8C-229A-4822-9E80-83EA7465900A}" type="datetimeFigureOut">
               <a:rPr lang="en-AU" smtClean="0"/>
-              <a:t>28/03/2022</a:t>
+              <a:t>14/05/2022</a:t>
             </a:fld>
             <a:endParaRPr lang="en-AU"/>
           </a:p>
@@ -1149,7 +1149,7 @@
           <a:p>
             <a:fld id="{E4E07C8C-229A-4822-9E80-83EA7465900A}" type="datetimeFigureOut">
               <a:rPr lang="en-AU" smtClean="0"/>
-              <a:t>28/03/2022</a:t>
+              <a:t>14/05/2022</a:t>
             </a:fld>
             <a:endParaRPr lang="en-AU"/>
           </a:p>
@@ -1417,7 +1417,7 @@
           <a:p>
             <a:fld id="{E4E07C8C-229A-4822-9E80-83EA7465900A}" type="datetimeFigureOut">
               <a:rPr lang="en-AU" smtClean="0"/>
-              <a:t>28/03/2022</a:t>
+              <a:t>14/05/2022</a:t>
             </a:fld>
             <a:endParaRPr lang="en-AU"/>
           </a:p>
@@ -1832,7 +1832,7 @@
           <a:p>
             <a:fld id="{E4E07C8C-229A-4822-9E80-83EA7465900A}" type="datetimeFigureOut">
               <a:rPr lang="en-AU" smtClean="0"/>
-              <a:t>28/03/2022</a:t>
+              <a:t>14/05/2022</a:t>
             </a:fld>
             <a:endParaRPr lang="en-AU"/>
           </a:p>
@@ -1974,7 +1974,7 @@
           <a:p>
             <a:fld id="{E4E07C8C-229A-4822-9E80-83EA7465900A}" type="datetimeFigureOut">
               <a:rPr lang="en-AU" smtClean="0"/>
-              <a:t>28/03/2022</a:t>
+              <a:t>14/05/2022</a:t>
             </a:fld>
             <a:endParaRPr lang="en-AU"/>
           </a:p>
@@ -2087,7 +2087,7 @@
           <a:p>
             <a:fld id="{E4E07C8C-229A-4822-9E80-83EA7465900A}" type="datetimeFigureOut">
               <a:rPr lang="en-AU" smtClean="0"/>
-              <a:t>28/03/2022</a:t>
+              <a:t>14/05/2022</a:t>
             </a:fld>
             <a:endParaRPr lang="en-AU"/>
           </a:p>
@@ -2400,7 +2400,7 @@
           <a:p>
             <a:fld id="{E4E07C8C-229A-4822-9E80-83EA7465900A}" type="datetimeFigureOut">
               <a:rPr lang="en-AU" smtClean="0"/>
-              <a:t>28/03/2022</a:t>
+              <a:t>14/05/2022</a:t>
             </a:fld>
             <a:endParaRPr lang="en-AU"/>
           </a:p>
@@ -2689,7 +2689,7 @@
           <a:p>
             <a:fld id="{E4E07C8C-229A-4822-9E80-83EA7465900A}" type="datetimeFigureOut">
               <a:rPr lang="en-AU" smtClean="0"/>
-              <a:t>28/03/2022</a:t>
+              <a:t>14/05/2022</a:t>
             </a:fld>
             <a:endParaRPr lang="en-AU"/>
           </a:p>
@@ -2932,7 +2932,7 @@
           <a:p>
             <a:fld id="{E4E07C8C-229A-4822-9E80-83EA7465900A}" type="datetimeFigureOut">
               <a:rPr lang="en-AU" smtClean="0"/>
-              <a:t>28/03/2022</a:t>
+              <a:t>14/05/2022</a:t>
             </a:fld>
             <a:endParaRPr lang="en-AU"/>
           </a:p>
@@ -3775,7 +3775,7 @@
           <p:nvPr>
             <p:extLst>
               <p:ext uri="{D42A27DB-BD31-4B8C-83A1-F6EECF244321}">
-                <p14:modId xmlns:p14="http://schemas.microsoft.com/office/powerpoint/2010/main" val="834057532"/>
+                <p14:modId xmlns:p14="http://schemas.microsoft.com/office/powerpoint/2010/main" val="4019192863"/>
               </p:ext>
             </p:extLst>
           </p:nvPr>
@@ -4000,13 +4000,13 @@
                         </a:lnSpc>
                       </a:pPr>
                       <a:r>
-                        <a:rPr lang="en-AU" sz="1800" dirty="0" err="1">
+                        <a:rPr lang="en-AU" sz="1800">
                           <a:effectLst/>
                           <a:latin typeface="+mn-lt"/>
                           <a:ea typeface="Times New Roman" panose="02020603050405020304" pitchFamily="18" charset="0"/>
                           <a:cs typeface="Times New Roman" panose="02020603050405020304" pitchFamily="18" charset="0"/>
                         </a:rPr>
-                        <a:t>WiFi</a:t>
+                        <a:t>Wi-Fi </a:t>
                       </a:r>
                       <a:r>
                         <a:rPr lang="en-AU" sz="1800" dirty="0">
@@ -4015,7 +4015,7 @@
                           <a:ea typeface="Times New Roman" panose="02020603050405020304" pitchFamily="18" charset="0"/>
                           <a:cs typeface="Times New Roman" panose="02020603050405020304" pitchFamily="18" charset="0"/>
                         </a:rPr>
-                        <a:t> and 802.11 Regulations, Standards, Organizations and ethical practice </a:t>
+                        <a:t>and 802.11 Regulations, Standards, Organizations</a:t>
                       </a:r>
                       <a:endParaRPr lang="en-AU" sz="1800" dirty="0">
                         <a:effectLst/>
@@ -4109,7 +4109,7 @@
                           <a:ea typeface="Times New Roman" panose="02020603050405020304" pitchFamily="18" charset="0"/>
                           <a:cs typeface="Times New Roman" panose="02020603050405020304" pitchFamily="18" charset="0"/>
                         </a:rPr>
-                        <a:t>Spectrum use and management and signal transmission </a:t>
+                        <a:t>RF Principles, spectrum use and management and signal transmission </a:t>
                       </a:r>
                       <a:endParaRPr lang="en-AU" sz="1800" dirty="0">
                         <a:effectLst/>
@@ -4861,7 +4861,7 @@
                           <a:ea typeface="Times New Roman" panose="02020603050405020304" pitchFamily="18" charset="0"/>
                           <a:cs typeface="Times New Roman" panose="02020603050405020304" pitchFamily="18" charset="0"/>
                         </a:rPr>
-                        <a:t>Emerging trends and ACS Code of Ethics in wireless networking</a:t>
+                        <a:t>Emerging trends and ACS Code of Ethics in Wireless Networking</a:t>
                       </a:r>
                       <a:endParaRPr lang="en-AU" sz="1800" dirty="0">
                         <a:effectLst/>

</xml_diff>